<commit_message>
Refine quad chart with concise, scannable content matching template format
Updated VS26 deliverables:

1. VS26_Isidore_Quantum_Quad_Chart.pptx (refined)
   - Slide 1: Brief experiment overview with 2-3 sentence descriptions
   - Slide 2: Concise deployment and requirements summary
   - Content now matches template's intended scannable format
   - Removed verbose paragraphs in favor of brief, professional descriptions

2. VS26_Isidore_Quantum_Quad_Chart_Text.docx (updated)
   - Corresponding text content in concise format
   - Organized by slide section for easy reference and editing
   - Maintains brief descriptions matching quad chart slide content

All three deliverables now follow proper VS26 format guidelines:
- White paper: Full narrative format (4 pages)
- Quad chart: Concise, scannable format (2 slides)
- Text reference: Editable brief content for quick updates
</commit_message>
<xml_diff>
--- a/Data Team/VS26_Isidore_Quantum_Quad_Chart.pptx
+++ b/Data Team/VS26_Isidore_Quantum_Quad_Chart.pptx
@@ -4463,8 +4463,14 @@
               <a:buNone/>
             </a:pPr>
             <a:r>
-              <a:rPr sz="1400"/>
-              <a:t>(U) Test and validate NSA-engineered post-quantum encryption platform for maritime operations. Solution addresses dual cyber threats (current APTs and future quantum-enabled adversaries) with drop-in integration, autonomous threat detection, and CNSA 2.0 compliance. Demonstrates TRL 8-9 advancement in operational naval environment.</a:t>
+              <a:rPr sz="1100"/>
+              <a:t>(U) Description: Validate NSA-engineered post-quantum encryption platform for maritime operations. Addresses dual threats: current cyber attacks (spoofing, ransomware, malware) and future quantum-enabled adversaries. Drop-in integration with zero infrastructure retrofits.</a:t>
+            </a:r>
+            <a:br/>
+            <a:br/>
+            <a:r>
+              <a:rPr sz="1100"/>
+              <a:t>(U) Objective: Demonstrate TRL 8-9 advancement in operational naval environment with autonomous threat detection and CNSA 2.0 compliance.</a:t>
             </a:r>
           </a:p>
         </p:txBody>
@@ -4653,8 +4659,26 @@
               <a:buNone/>
             </a:pPr>
             <a:r>
-              <a:rPr sz="1100"/>
-              <a:t>(U) Availability date: Q2-Q3 2026 (Exercise Window 28 JUN 2026)</a:t>
+              <a:rPr sz="1000"/>
+              <a:t>(U) Availability date: Q2-Q3 2026 (Exercise execution 28 JUN 2026)</a:t>
+            </a:r>
+            <a:br/>
+            <a:br/>
+            <a:r>
+              <a:rPr sz="1000"/>
+              <a:t>(U) Program risks / impact: Minimal - drop-in design, autonomous post-deployment. Early validation supports Navy modernization priorities.</a:t>
+            </a:r>
+            <a:br/>
+            <a:br/>
+            <a:r>
+              <a:rPr sz="1000"/>
+              <a:t>(U) Geographical domain: Maritime (vessels, ports, satellite links)</a:t>
+            </a:r>
+            <a:br/>
+            <a:br/>
+            <a:r>
+              <a:rPr sz="1000"/>
+              <a:t>(U) Recommended host unit: PACFLT (Third Fleet or Seventh Fleet operational assets)</a:t>
             </a:r>
           </a:p>
         </p:txBody>
@@ -4843,8 +4867,20 @@
               <a:buNone/>
             </a:pPr>
             <a:r>
-              <a:rPr sz="1100"/>
-              <a:t>(U) Experimentation sponsor: United States Pacific Fleet (PACFLT); Supporting: USINDOPACOM J81 JEESC, Naval Supply Systems Command</a:t>
+              <a:rPr sz="1000"/>
+              <a:t>(U) Experimentation sponsor: United States Pacific Fleet (PACFLT). Supporting: USINDOPACOM J81 JEESC, Naval Supply Systems Command.</a:t>
+            </a:r>
+            <a:br/>
+            <a:br/>
+            <a:r>
+              <a:rPr sz="1000"/>
+              <a:t>(U) Funding status: Forward Edge-AI funded. NSA partnership supports R&amp;D costs.</a:t>
+            </a:r>
+            <a:br/>
+            <a:br/>
+            <a:r>
+              <a:rPr sz="1000"/>
+              <a:t>(U) POC: Brandon@forwardedge.ai | forwardedge.ai</a:t>
             </a:r>
           </a:p>
         </p:txBody>
@@ -5033,8 +5069,8 @@
               <a:buNone/>
             </a:pPr>
             <a:r>
-              <a:rPr sz="2400" b="1"/>
-              <a:t>(U) Quantum-Safe Maritime Cybersecurity Platform Validation - Isidore Quantum®</a:t>
+              <a:rPr sz="2000" b="1"/>
+              <a:t>(U) Quantum-Safe Maritime Cybersecurity - Isidore Quantum®</a:t>
             </a:r>
           </a:p>
         </p:txBody>
@@ -6016,7 +6052,7 @@
             </a:pPr>
             <a:r>
               <a:rPr sz="1000"/>
-              <a:t>(U) Deployment: Minimum 2 operational naval vessels (AIS/GPS bridge integration), 1 major WESTPAC port facility (logistics platform testing), 1 satellite gateway facility (VSAT/SATCOM validation). Integration duration: 4-6 weeks within VS26 exercise timeline.</a:t>
+              <a:t>(U) Deployment: 2+ operational naval vessels (bridge/AIS systems), 1 major WESTPAC port facility, 1 satellite gateway. Forward Edge-AI technical team for integration support. Duration: 4-6 weeks during VS26 exercise window.</a:t>
             </a:r>
           </a:p>
         </p:txBody>
@@ -6206,7 +6242,7 @@
             </a:pPr>
             <a:r>
               <a:rPr sz="1000"/>
-              <a:t>(U) Host component / unit support requested: Third Fleet or Seventh Fleet operational assets; PACFLT command staff for exercise coordination; Port of Guam or alternative WESTPAC facility; Satellite ground station operator support. Observer seats: 6-8 personnel (Cybersecurity SMEs, Command staff, Logistics personnel, Quantum specialists).</a:t>
+              <a:t>(U) Host component / unit support requested: Vessel bridge access and systems integration. Port logistics platform access. Satellite ground station coordination. Observer seats for 6-8 personnel (cybersecurity SMEs, command staff, logistics personnel). Power and network integration support.</a:t>
             </a:r>
           </a:p>
         </p:txBody>
@@ -6396,7 +6432,13 @@
             </a:pPr>
             <a:r>
               <a:rPr sz="1000"/>
-              <a:t>(U) Exercise considerations: Encrypted test channels for classified threat data. Drop-in integration minimizes operational disruption. No infrastructure retrofits required. Autonomous operation post-deployment. Real-time threat detection logs classified handling. Potential for early transition to operational Fleet units post-validation.</a:t>
+              <a:t>(U) Exercise considerations: Encrypted threat data handling (classified). Autonomous operation minimizes host unit burden post-integration. No infrastructure retrofits required. Real-time threat logs require secure reporting infrastructure.</a:t>
+            </a:r>
+            <a:br/>
+            <a:br/>
+            <a:r>
+              <a:rPr sz="1000"/>
+              <a:t>(U) Required Exercise events: Operational vessel underway time; port cargo operations; satellite communication exercises.</a:t>
             </a:r>
           </a:p>
         </p:txBody>
@@ -6586,7 +6628,7 @@
             </a:pPr>
             <a:r>
               <a:rPr sz="1000"/>
-              <a:t>(U) Personnel / equipment list: Forward Edge-AI Integration Team (2-3); Naval IT Personnel (4-5); Port Operations Staff (2-3); Observers/SMEs (6-8). Hardware: Isidore Quantum units (3-4 variants), Integration equipment, Test terminals, Comm infrastructure. Estimated SWaP: &lt;12W per unit, compact form factor (140x89x39mm).</a:t>
+              <a:t>(U) Personnel / equipment list: Forward Edge-AI integration team (2-3), Naval IT personnel (4-5), Port ops staff (2-3), Observers (6-8). Isidore Quantum units (variants: Enterprise, Standard, IoT). Power: &lt;12W per unit. Footprint: 140x89x39mm. Latency: &lt;90µs.</a:t>
             </a:r>
             <a:endParaRPr lang="en-US" altLang="en-US" sz="1800" b="0" dirty="0"/>
           </a:p>
@@ -6776,8 +6818,8 @@
               <a:buNone/>
             </a:pPr>
             <a:r>
-              <a:rPr sz="2000" b="1"/>
-              <a:t>(U) Quantum-Safe Maritime Cybersecurity Platform Validation - Isidore Quantum®</a:t>
+              <a:rPr sz="1800" b="1"/>
+              <a:t>(U) Quantum-Safe Maritime Cybersecurity - Isidore Quantum®</a:t>
             </a:r>
           </a:p>
         </p:txBody>

</xml_diff>